<commit_message>
Bug fixes, adding Java evaluation of expressions
</commit_message>
<xml_diff>
--- a/docs/presentation/Presentation.pptx
+++ b/docs/presentation/Presentation.pptx
@@ -3185,7 +3185,7 @@
           <a:p>
             <a:r>
               <a:rPr lang="en-US" dirty="0" smtClean="0"/>
-              <a:t>Bad Idea!</a:t>
+              <a:t>Yikes!</a:t>
             </a:r>
             <a:endParaRPr lang="en-US" dirty="0"/>
           </a:p>
@@ -3334,7 +3334,7 @@
                 <a:ea typeface="+mn-ea"/>
                 <a:cs typeface="+mn-cs"/>
               </a:rPr>
-              <a:t> not be a worthwhile endeavor</a:t>
+              <a:t> not be such a great idea</a:t>
             </a:r>
           </a:p>
         </p:txBody>
@@ -4473,20 +4473,40 @@
         </p:nvSpPr>
         <p:spPr/>
         <p:txBody>
-          <a:bodyPr/>
-          <a:lstStyle/>
-          <a:p>
-            <a:r>
-              <a:rPr lang="en-US" dirty="0" smtClean="0"/>
-              <a:t>Processing 10,000 logical expressions:</a:t>
-            </a:r>
+          <a:bodyPr>
+            <a:normAutofit fontScale="92500" lnSpcReduction="20000"/>
+          </a:bodyPr>
+          <a:lstStyle/>
+          <a:p>
+            <a:r>
+              <a:rPr lang="en-US" dirty="0" smtClean="0"/>
+              <a:t>Processing </a:t>
+            </a:r>
+            <a:r>
+              <a:rPr lang="en-US" dirty="0" smtClean="0"/>
+              <a:t>1000 </a:t>
+            </a:r>
+            <a:r>
+              <a:rPr lang="en-US" dirty="0" smtClean="0"/>
+              <a:t>logical </a:t>
+            </a:r>
+            <a:r>
+              <a:rPr lang="en-US" dirty="0" smtClean="0"/>
+              <a:t>expressions with a max complexity of 3 elements and 100 independent variables:</a:t>
+            </a:r>
+            <a:endParaRPr lang="en-US" dirty="0" smtClean="0"/>
           </a:p>
           <a:p>
             <a:pPr lvl="1"/>
             <a:r>
               <a:rPr lang="en-US" dirty="0" smtClean="0"/>
-              <a:t>CPU:</a:t>
-            </a:r>
+              <a:t>CPU</a:t>
+            </a:r>
+            <a:r>
+              <a:rPr lang="en-US" dirty="0" smtClean="0"/>
+              <a:t>: 3 ms</a:t>
+            </a:r>
+            <a:endParaRPr lang="en-US" dirty="0" smtClean="0"/>
           </a:p>
           <a:p>
             <a:pPr lvl="1"/>
@@ -4496,7 +4516,7 @@
             </a:r>
             <a:r>
               <a:rPr lang="en-US" dirty="0" smtClean="0"/>
-              <a:t>:</a:t>
+              <a:t>: ~600 ms</a:t>
             </a:r>
           </a:p>
           <a:p>
@@ -4517,21 +4537,21 @@
             </a:r>
             <a:r>
               <a:rPr lang="en-US" dirty="0" smtClean="0"/>
-              <a:t>expression and transmitting it to </a:t>
-            </a:r>
-            <a:r>
-              <a:rPr lang="en-US" dirty="0" smtClean="0"/>
-              <a:t>the GPU is greater than the cost of simply evaluating it on the host!</a:t>
+              <a:t>expression, transmitting it to </a:t>
+            </a:r>
+            <a:r>
+              <a:rPr lang="en-US" dirty="0" smtClean="0"/>
+              <a:t>the GPU, decoding and evaluating it there, and then sending the results back to the CPU is </a:t>
+            </a:r>
+            <a:r>
+              <a:rPr lang="en-US" b="1" i="1" dirty="0" smtClean="0"/>
+              <a:t>much </a:t>
+            </a:r>
+            <a:r>
+              <a:rPr lang="en-US" dirty="0" smtClean="0"/>
+              <a:t>greater than the cost of simply evaluating it on the host!</a:t>
             </a:r>
             <a:endParaRPr lang="en-US" dirty="0" smtClean="0"/>
-          </a:p>
-          <a:p>
-            <a:pPr lvl="1"/>
-            <a:r>
-              <a:rPr lang="en-US" dirty="0" smtClean="0"/>
-              <a:t>Processing on the GPU is too complex – threads are totally divergent</a:t>
-            </a:r>
-            <a:endParaRPr lang="en-US" dirty="0"/>
           </a:p>
         </p:txBody>
       </p:sp>

</xml_diff>